<commit_message>
Make revisions based on Vera's comments and archive old manuscript.
</commit_message>
<xml_diff>
--- a/Figures/Fig 1 Henry Buck Design.pptx
+++ b/Figures/Fig 1 Henry Buck Design.pptx
@@ -125,12 +125,12 @@
   <pc:docChgLst>
     <pc:chgData name="Robert Clark" userId="37467bac-7372-42aa-b3a8-a4008ba67f9c" providerId="ADAL" clId="{B30F4748-2EDA-4F94-965A-F8510C775512}"/>
     <pc:docChg chg="undo custSel modSld">
-      <pc:chgData name="Robert Clark" userId="37467bac-7372-42aa-b3a8-a4008ba67f9c" providerId="ADAL" clId="{B30F4748-2EDA-4F94-965A-F8510C775512}" dt="2021-12-03T16:31:36.210" v="307" actId="20577"/>
+      <pc:chgData name="Robert Clark" userId="37467bac-7372-42aa-b3a8-a4008ba67f9c" providerId="ADAL" clId="{B30F4748-2EDA-4F94-965A-F8510C775512}" dt="2021-12-20T16:30:51.958" v="309" actId="20577"/>
       <pc:docMkLst>
         <pc:docMk/>
       </pc:docMkLst>
       <pc:sldChg chg="addSp delSp modSp mod">
-        <pc:chgData name="Robert Clark" userId="37467bac-7372-42aa-b3a8-a4008ba67f9c" providerId="ADAL" clId="{B30F4748-2EDA-4F94-965A-F8510C775512}" dt="2021-12-03T16:31:36.210" v="307" actId="20577"/>
+        <pc:chgData name="Robert Clark" userId="37467bac-7372-42aa-b3a8-a4008ba67f9c" providerId="ADAL" clId="{B30F4748-2EDA-4F94-965A-F8510C775512}" dt="2021-12-20T16:30:51.958" v="309" actId="20577"/>
         <pc:sldMkLst>
           <pc:docMk/>
           <pc:sldMk cId="3040723094" sldId="256"/>
@@ -256,7 +256,7 @@
           </ac:spMkLst>
         </pc:spChg>
         <pc:spChg chg="add mod">
-          <ac:chgData name="Robert Clark" userId="37467bac-7372-42aa-b3a8-a4008ba67f9c" providerId="ADAL" clId="{B30F4748-2EDA-4F94-965A-F8510C775512}" dt="2021-12-03T16:31:13.840" v="223" actId="20577"/>
+          <ac:chgData name="Robert Clark" userId="37467bac-7372-42aa-b3a8-a4008ba67f9c" providerId="ADAL" clId="{B30F4748-2EDA-4F94-965A-F8510C775512}" dt="2021-12-20T16:30:51.958" v="309" actId="20577"/>
           <ac:spMkLst>
             <pc:docMk/>
             <pc:sldMk cId="3040723094" sldId="256"/>
@@ -287,8 +287,8 @@
             <ac:spMk id="22" creationId="{DE44AD7C-500E-415E-BBBF-C7EB5F39839B}"/>
           </ac:spMkLst>
         </pc:spChg>
-        <pc:spChg chg="add mod">
-          <ac:chgData name="Robert Clark" userId="37467bac-7372-42aa-b3a8-a4008ba67f9c" providerId="ADAL" clId="{B30F4748-2EDA-4F94-965A-F8510C775512}" dt="2021-12-03T16:31:36.210" v="307" actId="20577"/>
+        <pc:spChg chg="add del mod">
+          <ac:chgData name="Robert Clark" userId="37467bac-7372-42aa-b3a8-a4008ba67f9c" providerId="ADAL" clId="{B30F4748-2EDA-4F94-965A-F8510C775512}" dt="2021-12-20T16:30:51.095" v="308" actId="478"/>
           <ac:spMkLst>
             <pc:docMk/>
             <pc:sldMk cId="3040723094" sldId="256"/>
@@ -536,7 +536,7 @@
           <a:p>
             <a:fld id="{D8BE940C-6F84-462D-BDF3-0F0BA7F0EF21}" type="datetimeFigureOut">
               <a:rPr lang="en-US" smtClean="0"/>
-              <a:t>12/3/2021</a:t>
+              <a:t>12/20/2021</a:t>
             </a:fld>
             <a:endParaRPr lang="en-US"/>
           </a:p>
@@ -734,7 +734,7 @@
           <a:p>
             <a:fld id="{D8BE940C-6F84-462D-BDF3-0F0BA7F0EF21}" type="datetimeFigureOut">
               <a:rPr lang="en-US" smtClean="0"/>
-              <a:t>12/3/2021</a:t>
+              <a:t>12/20/2021</a:t>
             </a:fld>
             <a:endParaRPr lang="en-US"/>
           </a:p>
@@ -942,7 +942,7 @@
           <a:p>
             <a:fld id="{D8BE940C-6F84-462D-BDF3-0F0BA7F0EF21}" type="datetimeFigureOut">
               <a:rPr lang="en-US" smtClean="0"/>
-              <a:t>12/3/2021</a:t>
+              <a:t>12/20/2021</a:t>
             </a:fld>
             <a:endParaRPr lang="en-US"/>
           </a:p>
@@ -1140,7 +1140,7 @@
           <a:p>
             <a:fld id="{D8BE940C-6F84-462D-BDF3-0F0BA7F0EF21}" type="datetimeFigureOut">
               <a:rPr lang="en-US" smtClean="0"/>
-              <a:t>12/3/2021</a:t>
+              <a:t>12/20/2021</a:t>
             </a:fld>
             <a:endParaRPr lang="en-US"/>
           </a:p>
@@ -1415,7 +1415,7 @@
           <a:p>
             <a:fld id="{D8BE940C-6F84-462D-BDF3-0F0BA7F0EF21}" type="datetimeFigureOut">
               <a:rPr lang="en-US" smtClean="0"/>
-              <a:t>12/3/2021</a:t>
+              <a:t>12/20/2021</a:t>
             </a:fld>
             <a:endParaRPr lang="en-US"/>
           </a:p>
@@ -1680,7 +1680,7 @@
           <a:p>
             <a:fld id="{D8BE940C-6F84-462D-BDF3-0F0BA7F0EF21}" type="datetimeFigureOut">
               <a:rPr lang="en-US" smtClean="0"/>
-              <a:t>12/3/2021</a:t>
+              <a:t>12/20/2021</a:t>
             </a:fld>
             <a:endParaRPr lang="en-US"/>
           </a:p>
@@ -2092,7 +2092,7 @@
           <a:p>
             <a:fld id="{D8BE940C-6F84-462D-BDF3-0F0BA7F0EF21}" type="datetimeFigureOut">
               <a:rPr lang="en-US" smtClean="0"/>
-              <a:t>12/3/2021</a:t>
+              <a:t>12/20/2021</a:t>
             </a:fld>
             <a:endParaRPr lang="en-US"/>
           </a:p>
@@ -2233,7 +2233,7 @@
           <a:p>
             <a:fld id="{D8BE940C-6F84-462D-BDF3-0F0BA7F0EF21}" type="datetimeFigureOut">
               <a:rPr lang="en-US" smtClean="0"/>
-              <a:t>12/3/2021</a:t>
+              <a:t>12/20/2021</a:t>
             </a:fld>
             <a:endParaRPr lang="en-US"/>
           </a:p>
@@ -2346,7 +2346,7 @@
           <a:p>
             <a:fld id="{D8BE940C-6F84-462D-BDF3-0F0BA7F0EF21}" type="datetimeFigureOut">
               <a:rPr lang="en-US" smtClean="0"/>
-              <a:t>12/3/2021</a:t>
+              <a:t>12/20/2021</a:t>
             </a:fld>
             <a:endParaRPr lang="en-US"/>
           </a:p>
@@ -2657,7 +2657,7 @@
           <a:p>
             <a:fld id="{D8BE940C-6F84-462D-BDF3-0F0BA7F0EF21}" type="datetimeFigureOut">
               <a:rPr lang="en-US" smtClean="0"/>
-              <a:t>12/3/2021</a:t>
+              <a:t>12/20/2021</a:t>
             </a:fld>
             <a:endParaRPr lang="en-US"/>
           </a:p>
@@ -2945,7 +2945,7 @@
           <a:p>
             <a:fld id="{D8BE940C-6F84-462D-BDF3-0F0BA7F0EF21}" type="datetimeFigureOut">
               <a:rPr lang="en-US" smtClean="0"/>
-              <a:t>12/3/2021</a:t>
+              <a:t>12/20/2021</a:t>
             </a:fld>
             <a:endParaRPr lang="en-US"/>
           </a:p>
@@ -3186,7 +3186,7 @@
           <a:p>
             <a:fld id="{D8BE940C-6F84-462D-BDF3-0F0BA7F0EF21}" type="datetimeFigureOut">
               <a:rPr lang="en-US" smtClean="0"/>
-              <a:t>12/3/2021</a:t>
+              <a:t>12/20/2021</a:t>
             </a:fld>
             <a:endParaRPr lang="en-US"/>
           </a:p>
@@ -4348,7 +4348,7 @@
           <a:p>
             <a:r>
               <a:rPr lang="en-US" dirty="0"/>
-              <a:t>Add*</a:t>
+              <a:t>Add</a:t>
             </a:r>
           </a:p>
         </p:txBody>
@@ -4454,67 +4454,6 @@
             <a:r>
               <a:rPr lang="en-US" dirty="0"/>
               <a:t>Remove</a:t>
-            </a:r>
-          </a:p>
-        </p:txBody>
-      </p:sp>
-      <p:sp>
-        <p:nvSpPr>
-          <p:cNvPr id="23" name="TextBox 22">
-            <a:extLst>
-              <a:ext uri="{FF2B5EF4-FFF2-40B4-BE49-F238E27FC236}">
-                <a16:creationId xmlns:a16="http://schemas.microsoft.com/office/drawing/2014/main" id="{6DFA9153-64B0-4956-A96C-D9D8611A8BAC}"/>
-              </a:ext>
-            </a:extLst>
-          </p:cNvPr>
-          <p:cNvSpPr txBox="1"/>
-          <p:nvPr/>
-        </p:nvSpPr>
-        <p:spPr>
-          <a:xfrm>
-            <a:off x="1670185" y="3544757"/>
-            <a:ext cx="3564052" cy="646331"/>
-          </a:xfrm>
-          <a:prstGeom prst="rect">
-            <a:avLst/>
-          </a:prstGeom>
-          <a:noFill/>
-        </p:spPr>
-        <p:txBody>
-          <a:bodyPr wrap="square" rtlCol="0">
-            <a:spAutoFit/>
-          </a:bodyPr>
-          <a:lstStyle/>
-          <a:p>
-            <a:r>
-              <a:rPr lang="en-US" dirty="0"/>
-              <a:t>Add – </a:t>
-            </a:r>
-            <a:r>
-              <a:rPr lang="en-US" i="1" dirty="0"/>
-              <a:t>Trillium </a:t>
-            </a:r>
-            <a:r>
-              <a:rPr lang="en-US" dirty="0"/>
-              <a:t>only supplementation</a:t>
-            </a:r>
-          </a:p>
-          <a:p>
-            <a:r>
-              <a:rPr lang="en-US" dirty="0"/>
-              <a:t>* Plot dominated by </a:t>
-            </a:r>
-            <a:r>
-              <a:rPr lang="en-US" i="1" dirty="0"/>
-              <a:t>Pinus </a:t>
-            </a:r>
-            <a:r>
-              <a:rPr lang="en-US" i="1" dirty="0" err="1"/>
-              <a:t>strobus</a:t>
-            </a:r>
-            <a:r>
-              <a:rPr lang="en-US" dirty="0"/>
-              <a:t> </a:t>
             </a:r>
           </a:p>
         </p:txBody>

</xml_diff>

<commit_message>
Update response to review and supplemental figures. Last change is to update the line numbers so they all match.
</commit_message>
<xml_diff>
--- a/Figures/Fig 1 Henry Buck Design.pptx
+++ b/Figures/Fig 1 Henry Buck Design.pptx
@@ -6,6 +6,7 @@
   </p:sldMasterIdLst>
   <p:sldIdLst>
     <p:sldId id="256" r:id="rId2"/>
+    <p:sldId id="257" r:id="rId3"/>
   </p:sldIdLst>
   <p:sldSz cx="12192000" cy="6858000"/>
   <p:notesSz cx="6858000" cy="9144000"/>
@@ -536,7 +537,7 @@
           <a:p>
             <a:fld id="{D8BE940C-6F84-462D-BDF3-0F0BA7F0EF21}" type="datetimeFigureOut">
               <a:rPr lang="en-US" smtClean="0"/>
-              <a:t>12/20/2021</a:t>
+              <a:t>3/30/2022</a:t>
             </a:fld>
             <a:endParaRPr lang="en-US"/>
           </a:p>
@@ -734,7 +735,7 @@
           <a:p>
             <a:fld id="{D8BE940C-6F84-462D-BDF3-0F0BA7F0EF21}" type="datetimeFigureOut">
               <a:rPr lang="en-US" smtClean="0"/>
-              <a:t>12/20/2021</a:t>
+              <a:t>3/30/2022</a:t>
             </a:fld>
             <a:endParaRPr lang="en-US"/>
           </a:p>
@@ -942,7 +943,7 @@
           <a:p>
             <a:fld id="{D8BE940C-6F84-462D-BDF3-0F0BA7F0EF21}" type="datetimeFigureOut">
               <a:rPr lang="en-US" smtClean="0"/>
-              <a:t>12/20/2021</a:t>
+              <a:t>3/30/2022</a:t>
             </a:fld>
             <a:endParaRPr lang="en-US"/>
           </a:p>
@@ -1140,7 +1141,7 @@
           <a:p>
             <a:fld id="{D8BE940C-6F84-462D-BDF3-0F0BA7F0EF21}" type="datetimeFigureOut">
               <a:rPr lang="en-US" smtClean="0"/>
-              <a:t>12/20/2021</a:t>
+              <a:t>3/30/2022</a:t>
             </a:fld>
             <a:endParaRPr lang="en-US"/>
           </a:p>
@@ -1415,7 +1416,7 @@
           <a:p>
             <a:fld id="{D8BE940C-6F84-462D-BDF3-0F0BA7F0EF21}" type="datetimeFigureOut">
               <a:rPr lang="en-US" smtClean="0"/>
-              <a:t>12/20/2021</a:t>
+              <a:t>3/30/2022</a:t>
             </a:fld>
             <a:endParaRPr lang="en-US"/>
           </a:p>
@@ -1680,7 +1681,7 @@
           <a:p>
             <a:fld id="{D8BE940C-6F84-462D-BDF3-0F0BA7F0EF21}" type="datetimeFigureOut">
               <a:rPr lang="en-US" smtClean="0"/>
-              <a:t>12/20/2021</a:t>
+              <a:t>3/30/2022</a:t>
             </a:fld>
             <a:endParaRPr lang="en-US"/>
           </a:p>
@@ -2092,7 +2093,7 @@
           <a:p>
             <a:fld id="{D8BE940C-6F84-462D-BDF3-0F0BA7F0EF21}" type="datetimeFigureOut">
               <a:rPr lang="en-US" smtClean="0"/>
-              <a:t>12/20/2021</a:t>
+              <a:t>3/30/2022</a:t>
             </a:fld>
             <a:endParaRPr lang="en-US"/>
           </a:p>
@@ -2233,7 +2234,7 @@
           <a:p>
             <a:fld id="{D8BE940C-6F84-462D-BDF3-0F0BA7F0EF21}" type="datetimeFigureOut">
               <a:rPr lang="en-US" smtClean="0"/>
-              <a:t>12/20/2021</a:t>
+              <a:t>3/30/2022</a:t>
             </a:fld>
             <a:endParaRPr lang="en-US"/>
           </a:p>
@@ -2346,7 +2347,7 @@
           <a:p>
             <a:fld id="{D8BE940C-6F84-462D-BDF3-0F0BA7F0EF21}" type="datetimeFigureOut">
               <a:rPr lang="en-US" smtClean="0"/>
-              <a:t>12/20/2021</a:t>
+              <a:t>3/30/2022</a:t>
             </a:fld>
             <a:endParaRPr lang="en-US"/>
           </a:p>
@@ -2657,7 +2658,7 @@
           <a:p>
             <a:fld id="{D8BE940C-6F84-462D-BDF3-0F0BA7F0EF21}" type="datetimeFigureOut">
               <a:rPr lang="en-US" smtClean="0"/>
-              <a:t>12/20/2021</a:t>
+              <a:t>3/30/2022</a:t>
             </a:fld>
             <a:endParaRPr lang="en-US"/>
           </a:p>
@@ -2945,7 +2946,7 @@
           <a:p>
             <a:fld id="{D8BE940C-6F84-462D-BDF3-0F0BA7F0EF21}" type="datetimeFigureOut">
               <a:rPr lang="en-US" smtClean="0"/>
-              <a:t>12/20/2021</a:t>
+              <a:t>3/30/2022</a:t>
             </a:fld>
             <a:endParaRPr lang="en-US"/>
           </a:p>
@@ -3186,7 +3187,7 @@
           <a:p>
             <a:fld id="{D8BE940C-6F84-462D-BDF3-0F0BA7F0EF21}" type="datetimeFigureOut">
               <a:rPr lang="en-US" smtClean="0"/>
-              <a:t>12/20/2021</a:t>
+              <a:t>3/30/2022</a:t>
             </a:fld>
             <a:endParaRPr lang="en-US"/>
           </a:p>
@@ -4770,6 +4771,671 @@
 </p:sld>
 </file>
 
+<file path=ppt/slides/slide2.xml><?xml version="1.0" encoding="utf-8"?>
+<p:sld xmlns:a="http://schemas.openxmlformats.org/drawingml/2006/main" xmlns:r="http://schemas.openxmlformats.org/officeDocument/2006/relationships" xmlns:p="http://schemas.openxmlformats.org/presentationml/2006/main">
+  <p:cSld>
+    <p:spTree>
+      <p:nvGrpSpPr>
+        <p:cNvPr id="1" name=""/>
+        <p:cNvGrpSpPr/>
+        <p:nvPr/>
+      </p:nvGrpSpPr>
+      <p:grpSpPr>
+        <a:xfrm>
+          <a:off x="0" y="0"/>
+          <a:ext cx="0" cy="0"/>
+          <a:chOff x="0" y="0"/>
+          <a:chExt cx="0" cy="0"/>
+        </a:xfrm>
+      </p:grpSpPr>
+      <p:sp>
+        <p:nvSpPr>
+          <p:cNvPr id="4" name="Rectangle 3">
+            <a:extLst>
+              <a:ext uri="{FF2B5EF4-FFF2-40B4-BE49-F238E27FC236}">
+                <a16:creationId xmlns:a16="http://schemas.microsoft.com/office/drawing/2014/main" id="{A33C1844-FA7F-4C63-B918-0DF3AF714611}"/>
+              </a:ext>
+            </a:extLst>
+          </p:cNvPr>
+          <p:cNvSpPr/>
+          <p:nvPr/>
+        </p:nvSpPr>
+        <p:spPr>
+          <a:xfrm>
+            <a:off x="4992129" y="2323069"/>
+            <a:ext cx="2286000" cy="2286000"/>
+          </a:xfrm>
+          <a:prstGeom prst="rect">
+            <a:avLst/>
+          </a:prstGeom>
+          <a:noFill/>
+          <a:ln w="38100">
+            <a:solidFill>
+              <a:schemeClr val="tx1"/>
+            </a:solidFill>
+          </a:ln>
+        </p:spPr>
+        <p:style>
+          <a:lnRef idx="2">
+            <a:schemeClr val="accent1">
+              <a:shade val="50000"/>
+            </a:schemeClr>
+          </a:lnRef>
+          <a:fillRef idx="1">
+            <a:schemeClr val="accent1"/>
+          </a:fillRef>
+          <a:effectRef idx="0">
+            <a:schemeClr val="accent1"/>
+          </a:effectRef>
+          <a:fontRef idx="minor">
+            <a:schemeClr val="lt1"/>
+          </a:fontRef>
+        </p:style>
+        <p:txBody>
+          <a:bodyPr rot="0" spcFirstLastPara="0" vertOverflow="overflow" horzOverflow="overflow" vert="horz" wrap="square" lIns="91440" tIns="45720" rIns="91440" bIns="45720" numCol="1" spcCol="0" rtlCol="0" fromWordArt="0" anchor="ctr" anchorCtr="0" forceAA="0" compatLnSpc="1">
+            <a:prstTxWarp prst="textNoShape">
+              <a:avLst/>
+            </a:prstTxWarp>
+            <a:noAutofit/>
+          </a:bodyPr>
+          <a:lstStyle/>
+          <a:p>
+            <a:pPr algn="ctr"/>
+            <a:endParaRPr lang="en-US" dirty="0">
+              <a:latin typeface="Arial" panose="020B0604020202020204" pitchFamily="34" charset="0"/>
+              <a:cs typeface="Arial" panose="020B0604020202020204" pitchFamily="34" charset="0"/>
+            </a:endParaRPr>
+          </a:p>
+        </p:txBody>
+      </p:sp>
+      <p:sp>
+        <p:nvSpPr>
+          <p:cNvPr id="5" name="TextBox 4">
+            <a:extLst>
+              <a:ext uri="{FF2B5EF4-FFF2-40B4-BE49-F238E27FC236}">
+                <a16:creationId xmlns:a16="http://schemas.microsoft.com/office/drawing/2014/main" id="{8F7910C5-6323-4D28-AD6C-0CF8B7540E85}"/>
+              </a:ext>
+            </a:extLst>
+          </p:cNvPr>
+          <p:cNvSpPr txBox="1"/>
+          <p:nvPr/>
+        </p:nvSpPr>
+        <p:spPr>
+          <a:xfrm>
+            <a:off x="7285689" y="2688185"/>
+            <a:ext cx="2613796" cy="369332"/>
+          </a:xfrm>
+          <a:prstGeom prst="rect">
+            <a:avLst/>
+          </a:prstGeom>
+          <a:noFill/>
+        </p:spPr>
+        <p:txBody>
+          <a:bodyPr wrap="square">
+            <a:spAutoFit/>
+          </a:bodyPr>
+          <a:lstStyle/>
+          <a:p>
+            <a:r>
+              <a:rPr lang="en-US" dirty="0"/>
+              <a:t>Plant cover line transect</a:t>
+            </a:r>
+          </a:p>
+        </p:txBody>
+      </p:sp>
+      <p:sp>
+        <p:nvSpPr>
+          <p:cNvPr id="6" name="TextBox 5">
+            <a:extLst>
+              <a:ext uri="{FF2B5EF4-FFF2-40B4-BE49-F238E27FC236}">
+                <a16:creationId xmlns:a16="http://schemas.microsoft.com/office/drawing/2014/main" id="{F6DCFC7F-931D-453E-89AE-D7B782CAD9E5}"/>
+              </a:ext>
+            </a:extLst>
+          </p:cNvPr>
+          <p:cNvSpPr txBox="1"/>
+          <p:nvPr/>
+        </p:nvSpPr>
+        <p:spPr>
+          <a:xfrm>
+            <a:off x="4324865" y="3267913"/>
+            <a:ext cx="736851" cy="369332"/>
+          </a:xfrm>
+          <a:prstGeom prst="rect">
+            <a:avLst/>
+          </a:prstGeom>
+          <a:noFill/>
+        </p:spPr>
+        <p:txBody>
+          <a:bodyPr wrap="square">
+            <a:spAutoFit/>
+          </a:bodyPr>
+          <a:lstStyle/>
+          <a:p>
+            <a:r>
+              <a:rPr lang="en-US" dirty="0"/>
+              <a:t>50m</a:t>
+            </a:r>
+          </a:p>
+        </p:txBody>
+      </p:sp>
+      <p:cxnSp>
+        <p:nvCxnSpPr>
+          <p:cNvPr id="9" name="Straight Arrow Connector 8">
+            <a:extLst>
+              <a:ext uri="{FF2B5EF4-FFF2-40B4-BE49-F238E27FC236}">
+                <a16:creationId xmlns:a16="http://schemas.microsoft.com/office/drawing/2014/main" id="{14E97C70-0FB5-48DD-8A71-68C569D9F06E}"/>
+              </a:ext>
+            </a:extLst>
+          </p:cNvPr>
+          <p:cNvCxnSpPr>
+            <a:cxnSpLocks/>
+          </p:cNvCxnSpPr>
+          <p:nvPr/>
+        </p:nvCxnSpPr>
+        <p:spPr>
+          <a:xfrm flipV="1">
+            <a:off x="5061716" y="2421925"/>
+            <a:ext cx="2154386" cy="2092410"/>
+          </a:xfrm>
+          <a:prstGeom prst="straightConnector1">
+            <a:avLst/>
+          </a:prstGeom>
+          <a:ln w="76200">
+            <a:solidFill>
+              <a:schemeClr val="tx1">
+                <a:lumMod val="95000"/>
+                <a:lumOff val="5000"/>
+              </a:schemeClr>
+            </a:solidFill>
+            <a:tailEnd type="triangle"/>
+          </a:ln>
+        </p:spPr>
+        <p:style>
+          <a:lnRef idx="1">
+            <a:schemeClr val="accent1"/>
+          </a:lnRef>
+          <a:fillRef idx="0">
+            <a:schemeClr val="accent1"/>
+          </a:fillRef>
+          <a:effectRef idx="0">
+            <a:schemeClr val="accent1"/>
+          </a:effectRef>
+          <a:fontRef idx="minor">
+            <a:schemeClr val="tx1"/>
+          </a:fontRef>
+        </p:style>
+      </p:cxnSp>
+      <p:cxnSp>
+        <p:nvCxnSpPr>
+          <p:cNvPr id="11" name="Straight Arrow Connector 10">
+            <a:extLst>
+              <a:ext uri="{FF2B5EF4-FFF2-40B4-BE49-F238E27FC236}">
+                <a16:creationId xmlns:a16="http://schemas.microsoft.com/office/drawing/2014/main" id="{8B899CCA-DCE3-4EBF-B574-F63162E0CD4B}"/>
+              </a:ext>
+            </a:extLst>
+          </p:cNvPr>
+          <p:cNvCxnSpPr>
+            <a:cxnSpLocks/>
+          </p:cNvCxnSpPr>
+          <p:nvPr/>
+        </p:nvCxnSpPr>
+        <p:spPr>
+          <a:xfrm>
+            <a:off x="5061716" y="2421925"/>
+            <a:ext cx="2154386" cy="2092410"/>
+          </a:xfrm>
+          <a:prstGeom prst="straightConnector1">
+            <a:avLst/>
+          </a:prstGeom>
+          <a:ln w="76200">
+            <a:solidFill>
+              <a:schemeClr val="tx1">
+                <a:lumMod val="95000"/>
+                <a:lumOff val="5000"/>
+              </a:schemeClr>
+            </a:solidFill>
+            <a:tailEnd type="triangle"/>
+          </a:ln>
+        </p:spPr>
+        <p:style>
+          <a:lnRef idx="1">
+            <a:schemeClr val="accent1"/>
+          </a:lnRef>
+          <a:fillRef idx="0">
+            <a:schemeClr val="accent1"/>
+          </a:fillRef>
+          <a:effectRef idx="0">
+            <a:schemeClr val="accent1"/>
+          </a:effectRef>
+          <a:fontRef idx="minor">
+            <a:schemeClr val="tx1"/>
+          </a:fontRef>
+        </p:style>
+      </p:cxnSp>
+      <p:sp>
+        <p:nvSpPr>
+          <p:cNvPr id="16" name="Oval 15">
+            <a:extLst>
+              <a:ext uri="{FF2B5EF4-FFF2-40B4-BE49-F238E27FC236}">
+                <a16:creationId xmlns:a16="http://schemas.microsoft.com/office/drawing/2014/main" id="{504697B9-E30D-437E-80D4-BC35ADFFBA4D}"/>
+              </a:ext>
+            </a:extLst>
+          </p:cNvPr>
+          <p:cNvSpPr/>
+          <p:nvPr/>
+        </p:nvSpPr>
+        <p:spPr>
+          <a:xfrm>
+            <a:off x="6015850" y="3329126"/>
+            <a:ext cx="256753" cy="246906"/>
+          </a:xfrm>
+          <a:prstGeom prst="ellipse">
+            <a:avLst/>
+          </a:prstGeom>
+          <a:solidFill>
+            <a:schemeClr val="accent2"/>
+          </a:solidFill>
+        </p:spPr>
+        <p:style>
+          <a:lnRef idx="2">
+            <a:schemeClr val="accent1">
+              <a:shade val="50000"/>
+            </a:schemeClr>
+          </a:lnRef>
+          <a:fillRef idx="1">
+            <a:schemeClr val="accent1"/>
+          </a:fillRef>
+          <a:effectRef idx="0">
+            <a:schemeClr val="accent1"/>
+          </a:effectRef>
+          <a:fontRef idx="minor">
+            <a:schemeClr val="lt1"/>
+          </a:fontRef>
+        </p:style>
+        <p:txBody>
+          <a:bodyPr rtlCol="0" anchor="ctr"/>
+          <a:lstStyle/>
+          <a:p>
+            <a:pPr algn="ctr"/>
+            <a:endParaRPr lang="en-US" dirty="0"/>
+          </a:p>
+        </p:txBody>
+      </p:sp>
+      <p:sp>
+        <p:nvSpPr>
+          <p:cNvPr id="17" name="Oval 16">
+            <a:extLst>
+              <a:ext uri="{FF2B5EF4-FFF2-40B4-BE49-F238E27FC236}">
+                <a16:creationId xmlns:a16="http://schemas.microsoft.com/office/drawing/2014/main" id="{0EC7D8A9-63D1-49E8-9468-282057F86B8F}"/>
+              </a:ext>
+            </a:extLst>
+          </p:cNvPr>
+          <p:cNvSpPr/>
+          <p:nvPr/>
+        </p:nvSpPr>
+        <p:spPr>
+          <a:xfrm>
+            <a:off x="5189601" y="3305547"/>
+            <a:ext cx="256753" cy="246906"/>
+          </a:xfrm>
+          <a:prstGeom prst="ellipse">
+            <a:avLst/>
+          </a:prstGeom>
+          <a:solidFill>
+            <a:schemeClr val="accent2"/>
+          </a:solidFill>
+        </p:spPr>
+        <p:style>
+          <a:lnRef idx="2">
+            <a:schemeClr val="accent1">
+              <a:shade val="50000"/>
+            </a:schemeClr>
+          </a:lnRef>
+          <a:fillRef idx="1">
+            <a:schemeClr val="accent1"/>
+          </a:fillRef>
+          <a:effectRef idx="0">
+            <a:schemeClr val="accent1"/>
+          </a:effectRef>
+          <a:fontRef idx="minor">
+            <a:schemeClr val="lt1"/>
+          </a:fontRef>
+        </p:style>
+        <p:txBody>
+          <a:bodyPr rtlCol="0" anchor="ctr"/>
+          <a:lstStyle/>
+          <a:p>
+            <a:pPr algn="ctr"/>
+            <a:endParaRPr lang="en-US" dirty="0"/>
+          </a:p>
+        </p:txBody>
+      </p:sp>
+      <p:sp>
+        <p:nvSpPr>
+          <p:cNvPr id="18" name="Oval 17">
+            <a:extLst>
+              <a:ext uri="{FF2B5EF4-FFF2-40B4-BE49-F238E27FC236}">
+                <a16:creationId xmlns:a16="http://schemas.microsoft.com/office/drawing/2014/main" id="{3CA410C0-76E3-439D-A2D8-0D2B3BA3DEF3}"/>
+              </a:ext>
+            </a:extLst>
+          </p:cNvPr>
+          <p:cNvSpPr/>
+          <p:nvPr/>
+        </p:nvSpPr>
+        <p:spPr>
+          <a:xfrm>
+            <a:off x="6792621" y="3305547"/>
+            <a:ext cx="256753" cy="246906"/>
+          </a:xfrm>
+          <a:prstGeom prst="ellipse">
+            <a:avLst/>
+          </a:prstGeom>
+          <a:solidFill>
+            <a:schemeClr val="accent2"/>
+          </a:solidFill>
+        </p:spPr>
+        <p:style>
+          <a:lnRef idx="2">
+            <a:schemeClr val="accent1">
+              <a:shade val="50000"/>
+            </a:schemeClr>
+          </a:lnRef>
+          <a:fillRef idx="1">
+            <a:schemeClr val="accent1"/>
+          </a:fillRef>
+          <a:effectRef idx="0">
+            <a:schemeClr val="accent1"/>
+          </a:effectRef>
+          <a:fontRef idx="minor">
+            <a:schemeClr val="lt1"/>
+          </a:fontRef>
+        </p:style>
+        <p:txBody>
+          <a:bodyPr rtlCol="0" anchor="ctr"/>
+          <a:lstStyle/>
+          <a:p>
+            <a:pPr algn="ctr"/>
+            <a:endParaRPr lang="en-US" dirty="0"/>
+          </a:p>
+        </p:txBody>
+      </p:sp>
+      <p:sp>
+        <p:nvSpPr>
+          <p:cNvPr id="19" name="Oval 18">
+            <a:extLst>
+              <a:ext uri="{FF2B5EF4-FFF2-40B4-BE49-F238E27FC236}">
+                <a16:creationId xmlns:a16="http://schemas.microsoft.com/office/drawing/2014/main" id="{3D291F0B-662B-4E12-8AFC-AB724056A542}"/>
+              </a:ext>
+            </a:extLst>
+          </p:cNvPr>
+          <p:cNvSpPr/>
+          <p:nvPr/>
+        </p:nvSpPr>
+        <p:spPr>
+          <a:xfrm>
+            <a:off x="6015849" y="4132785"/>
+            <a:ext cx="256753" cy="246906"/>
+          </a:xfrm>
+          <a:prstGeom prst="ellipse">
+            <a:avLst/>
+          </a:prstGeom>
+          <a:solidFill>
+            <a:schemeClr val="accent2"/>
+          </a:solidFill>
+        </p:spPr>
+        <p:style>
+          <a:lnRef idx="2">
+            <a:schemeClr val="accent1">
+              <a:shade val="50000"/>
+            </a:schemeClr>
+          </a:lnRef>
+          <a:fillRef idx="1">
+            <a:schemeClr val="accent1"/>
+          </a:fillRef>
+          <a:effectRef idx="0">
+            <a:schemeClr val="accent1"/>
+          </a:effectRef>
+          <a:fontRef idx="minor">
+            <a:schemeClr val="lt1"/>
+          </a:fontRef>
+        </p:style>
+        <p:txBody>
+          <a:bodyPr rtlCol="0" anchor="ctr"/>
+          <a:lstStyle/>
+          <a:p>
+            <a:pPr algn="ctr"/>
+            <a:endParaRPr lang="en-US" dirty="0"/>
+          </a:p>
+        </p:txBody>
+      </p:sp>
+      <p:sp>
+        <p:nvSpPr>
+          <p:cNvPr id="20" name="Oval 19">
+            <a:extLst>
+              <a:ext uri="{FF2B5EF4-FFF2-40B4-BE49-F238E27FC236}">
+                <a16:creationId xmlns:a16="http://schemas.microsoft.com/office/drawing/2014/main" id="{32463ED5-9DED-4B33-A0D7-E708FC98BC29}"/>
+              </a:ext>
+            </a:extLst>
+          </p:cNvPr>
+          <p:cNvSpPr/>
+          <p:nvPr/>
+        </p:nvSpPr>
+        <p:spPr>
+          <a:xfrm>
+            <a:off x="6015848" y="2562285"/>
+            <a:ext cx="256753" cy="246906"/>
+          </a:xfrm>
+          <a:prstGeom prst="ellipse">
+            <a:avLst/>
+          </a:prstGeom>
+          <a:solidFill>
+            <a:schemeClr val="accent2"/>
+          </a:solidFill>
+        </p:spPr>
+        <p:style>
+          <a:lnRef idx="2">
+            <a:schemeClr val="accent1">
+              <a:shade val="50000"/>
+            </a:schemeClr>
+          </a:lnRef>
+          <a:fillRef idx="1">
+            <a:schemeClr val="accent1"/>
+          </a:fillRef>
+          <a:effectRef idx="0">
+            <a:schemeClr val="accent1"/>
+          </a:effectRef>
+          <a:fontRef idx="minor">
+            <a:schemeClr val="lt1"/>
+          </a:fontRef>
+        </p:style>
+        <p:txBody>
+          <a:bodyPr rtlCol="0" anchor="ctr"/>
+          <a:lstStyle/>
+          <a:p>
+            <a:pPr algn="ctr"/>
+            <a:endParaRPr lang="en-US" dirty="0"/>
+          </a:p>
+        </p:txBody>
+      </p:sp>
+      <p:cxnSp>
+        <p:nvCxnSpPr>
+          <p:cNvPr id="21" name="Straight Arrow Connector 20">
+            <a:extLst>
+              <a:ext uri="{FF2B5EF4-FFF2-40B4-BE49-F238E27FC236}">
+                <a16:creationId xmlns:a16="http://schemas.microsoft.com/office/drawing/2014/main" id="{8204AEEB-C558-4534-B834-59603CAD8FCE}"/>
+              </a:ext>
+            </a:extLst>
+          </p:cNvPr>
+          <p:cNvCxnSpPr>
+            <a:cxnSpLocks/>
+          </p:cNvCxnSpPr>
+          <p:nvPr/>
+        </p:nvCxnSpPr>
+        <p:spPr>
+          <a:xfrm>
+            <a:off x="7790652" y="3191432"/>
+            <a:ext cx="1305968" cy="0"/>
+          </a:xfrm>
+          <a:prstGeom prst="straightConnector1">
+            <a:avLst/>
+          </a:prstGeom>
+          <a:ln w="76200">
+            <a:solidFill>
+              <a:schemeClr val="tx1">
+                <a:lumMod val="95000"/>
+                <a:lumOff val="5000"/>
+              </a:schemeClr>
+            </a:solidFill>
+            <a:tailEnd type="triangle"/>
+          </a:ln>
+        </p:spPr>
+        <p:style>
+          <a:lnRef idx="1">
+            <a:schemeClr val="accent1"/>
+          </a:lnRef>
+          <a:fillRef idx="0">
+            <a:schemeClr val="accent1"/>
+          </a:fillRef>
+          <a:effectRef idx="0">
+            <a:schemeClr val="accent1"/>
+          </a:effectRef>
+          <a:fontRef idx="minor">
+            <a:schemeClr val="tx1"/>
+          </a:fontRef>
+        </p:style>
+      </p:cxnSp>
+      <p:sp>
+        <p:nvSpPr>
+          <p:cNvPr id="23" name="TextBox 22">
+            <a:extLst>
+              <a:ext uri="{FF2B5EF4-FFF2-40B4-BE49-F238E27FC236}">
+                <a16:creationId xmlns:a16="http://schemas.microsoft.com/office/drawing/2014/main" id="{7E95C2C0-3F50-4623-98D5-2D6A7DD8552B}"/>
+              </a:ext>
+            </a:extLst>
+          </p:cNvPr>
+          <p:cNvSpPr txBox="1"/>
+          <p:nvPr/>
+        </p:nvSpPr>
+        <p:spPr>
+          <a:xfrm>
+            <a:off x="6047479" y="1970708"/>
+            <a:ext cx="736851" cy="369332"/>
+          </a:xfrm>
+          <a:prstGeom prst="rect">
+            <a:avLst/>
+          </a:prstGeom>
+          <a:noFill/>
+        </p:spPr>
+        <p:txBody>
+          <a:bodyPr wrap="square">
+            <a:spAutoFit/>
+          </a:bodyPr>
+          <a:lstStyle/>
+          <a:p>
+            <a:r>
+              <a:rPr lang="en-US" dirty="0"/>
+              <a:t>50m</a:t>
+            </a:r>
+          </a:p>
+        </p:txBody>
+      </p:sp>
+      <p:sp>
+        <p:nvSpPr>
+          <p:cNvPr id="24" name="Oval 23">
+            <a:extLst>
+              <a:ext uri="{FF2B5EF4-FFF2-40B4-BE49-F238E27FC236}">
+                <a16:creationId xmlns:a16="http://schemas.microsoft.com/office/drawing/2014/main" id="{4DFE2DAB-9E30-4710-BF16-888B07D8C61D}"/>
+              </a:ext>
+            </a:extLst>
+          </p:cNvPr>
+          <p:cNvSpPr/>
+          <p:nvPr/>
+        </p:nvSpPr>
+        <p:spPr>
+          <a:xfrm>
+            <a:off x="8248394" y="3779922"/>
+            <a:ext cx="256753" cy="246906"/>
+          </a:xfrm>
+          <a:prstGeom prst="ellipse">
+            <a:avLst/>
+          </a:prstGeom>
+          <a:solidFill>
+            <a:schemeClr val="accent2"/>
+          </a:solidFill>
+        </p:spPr>
+        <p:style>
+          <a:lnRef idx="2">
+            <a:schemeClr val="accent1">
+              <a:shade val="50000"/>
+            </a:schemeClr>
+          </a:lnRef>
+          <a:fillRef idx="1">
+            <a:schemeClr val="accent1"/>
+          </a:fillRef>
+          <a:effectRef idx="0">
+            <a:schemeClr val="accent1"/>
+          </a:effectRef>
+          <a:fontRef idx="minor">
+            <a:schemeClr val="lt1"/>
+          </a:fontRef>
+        </p:style>
+        <p:txBody>
+          <a:bodyPr rtlCol="0" anchor="ctr"/>
+          <a:lstStyle/>
+          <a:p>
+            <a:pPr algn="ctr"/>
+            <a:endParaRPr lang="en-US" dirty="0"/>
+          </a:p>
+        </p:txBody>
+      </p:sp>
+      <p:sp>
+        <p:nvSpPr>
+          <p:cNvPr id="28" name="TextBox 27">
+            <a:extLst>
+              <a:ext uri="{FF2B5EF4-FFF2-40B4-BE49-F238E27FC236}">
+                <a16:creationId xmlns:a16="http://schemas.microsoft.com/office/drawing/2014/main" id="{B620167F-F0DC-4625-8CD4-56F55077FFB5}"/>
+              </a:ext>
+            </a:extLst>
+          </p:cNvPr>
+          <p:cNvSpPr txBox="1"/>
+          <p:nvPr/>
+        </p:nvSpPr>
+        <p:spPr>
+          <a:xfrm>
+            <a:off x="7609986" y="3391366"/>
+            <a:ext cx="1739838" cy="369332"/>
+          </a:xfrm>
+          <a:prstGeom prst="rect">
+            <a:avLst/>
+          </a:prstGeom>
+          <a:noFill/>
+        </p:spPr>
+        <p:txBody>
+          <a:bodyPr wrap="square">
+            <a:spAutoFit/>
+          </a:bodyPr>
+          <a:lstStyle/>
+          <a:p>
+            <a:r>
+              <a:rPr lang="en-US" dirty="0"/>
+              <a:t>Ant bait location</a:t>
+            </a:r>
+          </a:p>
+        </p:txBody>
+      </p:sp>
+    </p:spTree>
+    <p:extLst>
+      <p:ext uri="{BB962C8B-B14F-4D97-AF65-F5344CB8AC3E}">
+        <p14:creationId xmlns:p14="http://schemas.microsoft.com/office/powerpoint/2010/main" val="2234434853"/>
+      </p:ext>
+    </p:extLst>
+  </p:cSld>
+  <p:clrMapOvr>
+    <a:masterClrMapping/>
+  </p:clrMapOvr>
+</p:sld>
+</file>
+
 <file path=ppt/theme/theme1.xml><?xml version="1.0" encoding="utf-8"?>
 <a:theme xmlns:a="http://schemas.openxmlformats.org/drawingml/2006/main" name="Office Theme">
   <a:themeElements>

</xml_diff>